<commit_message>
add slides for security and project infrastructure
</commit_message>
<xml_diff>
--- a/work/presentation/CP3402 Group 10.pptx
+++ b/work/presentation/CP3402 Group 10.pptx
@@ -14,9 +14,9 @@
     <p:sldId id="258" r:id="rId5"/>
     <p:sldId id="261" r:id="rId6"/>
     <p:sldId id="260" r:id="rId7"/>
-    <p:sldId id="262" r:id="rId8"/>
+    <p:sldId id="270" r:id="rId8"/>
     <p:sldId id="263" r:id="rId9"/>
-    <p:sldId id="268" r:id="rId10"/>
+    <p:sldId id="271" r:id="rId10"/>
     <p:sldId id="259" r:id="rId11"/>
     <p:sldId id="264" r:id="rId12"/>
     <p:sldId id="265" r:id="rId13"/>
@@ -930,10 +930,10 @@
               <a:buChar char="•"/>
             </a:pPr>
             <a:r>
-              <a:rPr lang="en-AU" sz="2000" b="0" strike="noStrike" spc="-1">
+              <a:rPr lang="en-AU" sz="2000" b="0" strike="noStrike" spc="-1" dirty="0">
                 <a:latin typeface="Arial"/>
               </a:rPr>
-              <a:t>Trello was a single Kanban project board.</a:t>
+              <a:t>VPS instead of a limited hosting provider</a:t>
             </a:r>
           </a:p>
           <a:p>
@@ -948,11 +948,26 @@
               <a:buChar char="•"/>
             </a:pPr>
             <a:r>
-              <a:rPr lang="en-AU" sz="2000" b="0" strike="noStrike" spc="-1">
+              <a:rPr lang="en-AU" sz="2000" b="0" strike="noStrike" spc="-1" dirty="0">
                 <a:latin typeface="Arial"/>
               </a:rPr>
-              <a:t>Trello was too distant to our communication and collaboration means.</a:t>
+              <a:t>Inexpensive DNS used for convenience</a:t>
             </a:r>
+          </a:p>
+          <a:p>
+            <a:pPr marL="171360" indent="-170280">
+              <a:lnSpc>
+                <a:spcPct val="100000"/>
+              </a:lnSpc>
+              <a:buClr>
+                <a:srgbClr val="000000"/>
+              </a:buClr>
+              <a:buFont typeface="Arial"/>
+              <a:buChar char="•"/>
+            </a:pPr>
+            <a:endParaRPr lang="en-AU" sz="2000" b="0" strike="noStrike" spc="-1" dirty="0">
+              <a:latin typeface="Arial"/>
+            </a:endParaRPr>
           </a:p>
         </p:txBody>
       </p:sp>
@@ -1012,6 +1027,11 @@
         </p:txBody>
       </p:sp>
     </p:spTree>
+    <p:extLst>
+      <p:ext uri="{BB962C8B-B14F-4D97-AF65-F5344CB8AC3E}">
+        <p14:creationId xmlns:p14="http://schemas.microsoft.com/office/powerpoint/2010/main" val="921273572"/>
+      </p:ext>
+    </p:extLst>
   </p:cSld>
   <p:clrMapOvr>
     <a:masterClrMapping/>
@@ -7525,7 +7545,7 @@
               </a:lnSpc>
             </a:pPr>
             <a:r>
-              <a:rPr lang="en-AU" sz="3200" b="1" strike="noStrike" spc="-1" dirty="0">
+              <a:rPr lang="en-AU" sz="3600" b="1" strike="noStrike" spc="-1" dirty="0">
                 <a:solidFill>
                   <a:srgbClr val="000000"/>
                 </a:solidFill>
@@ -7534,7 +7554,7 @@
               </a:rPr>
               <a:t>Let us cover our workflow.</a:t>
             </a:r>
-            <a:endParaRPr lang="en-AU" sz="3200" b="0" strike="noStrike" spc="-1" dirty="0">
+            <a:endParaRPr lang="en-AU" sz="3600" b="0" strike="noStrike" spc="-1" dirty="0">
               <a:latin typeface="Arial"/>
             </a:endParaRPr>
           </a:p>
@@ -7544,7 +7564,7 @@
                 <a:spcPct val="100000"/>
               </a:lnSpc>
             </a:pPr>
-            <a:endParaRPr lang="en-AU" sz="3200" b="0" strike="noStrike" spc="-1" dirty="0">
+            <a:endParaRPr lang="en-AU" sz="3600" b="0" strike="noStrike" spc="-1" dirty="0">
               <a:latin typeface="Arial"/>
             </a:endParaRPr>
           </a:p>
@@ -7555,7 +7575,7 @@
               </a:lnSpc>
             </a:pPr>
             <a:r>
-              <a:rPr lang="en-AU" sz="3200" b="1" strike="noStrike" spc="-1" dirty="0">
+              <a:rPr lang="en-AU" sz="3600" b="1" strike="noStrike" spc="-1" dirty="0">
                 <a:solidFill>
                   <a:srgbClr val="000000"/>
                 </a:solidFill>
@@ -7564,7 +7584,7 @@
               </a:rPr>
               <a:t>Let us reflect on what we did.</a:t>
             </a:r>
-            <a:endParaRPr lang="en-AU" sz="3200" b="0" strike="noStrike" spc="-1" dirty="0">
+            <a:endParaRPr lang="en-AU" sz="3600" b="0" strike="noStrike" spc="-1" dirty="0">
               <a:latin typeface="Arial"/>
             </a:endParaRPr>
           </a:p>
@@ -7574,7 +7594,7 @@
                 <a:spcPct val="100000"/>
               </a:lnSpc>
             </a:pPr>
-            <a:endParaRPr lang="en-AU" sz="3200" b="0" strike="noStrike" spc="-1" dirty="0">
+            <a:endParaRPr lang="en-AU" sz="3600" b="0" strike="noStrike" spc="-1" dirty="0">
               <a:latin typeface="Arial"/>
             </a:endParaRPr>
           </a:p>
@@ -7585,7 +7605,7 @@
               </a:lnSpc>
             </a:pPr>
             <a:r>
-              <a:rPr lang="en-AU" sz="3200" b="1" strike="noStrike" spc="-1" dirty="0">
+              <a:rPr lang="en-AU" sz="3600" b="1" strike="noStrike" spc="-1" dirty="0">
                 <a:solidFill>
                   <a:srgbClr val="000000"/>
                 </a:solidFill>
@@ -7594,7 +7614,7 @@
               </a:rPr>
               <a:t>Let us suggest any improvements.</a:t>
             </a:r>
-            <a:endParaRPr lang="en-AU" sz="3200" b="0" strike="noStrike" spc="-1" dirty="0">
+            <a:endParaRPr lang="en-AU" sz="3600" b="0" strike="noStrike" spc="-1" dirty="0">
               <a:latin typeface="Arial"/>
             </a:endParaRPr>
           </a:p>
@@ -8693,7 +8713,7 @@
 </file>
 
 <file path=ppt/slides/slide6.xml><?xml version="1.0" encoding="utf-8"?>
-<p:sld xmlns:a="http://schemas.openxmlformats.org/drawingml/2006/main" xmlns:r="http://schemas.openxmlformats.org/officeDocument/2006/relationships" xmlns:p="http://schemas.openxmlformats.org/presentationml/2006/main" show="0">
+<p:sld xmlns:a="http://schemas.openxmlformats.org/drawingml/2006/main" xmlns:r="http://schemas.openxmlformats.org/officeDocument/2006/relationships" xmlns:p="http://schemas.openxmlformats.org/presentationml/2006/main">
   <p:cSld>
     <p:spTree>
       <p:nvGrpSpPr>
@@ -8750,214 +8770,193 @@
               </a:lnSpc>
             </a:pPr>
             <a:r>
-              <a:rPr lang="en-AU" sz="3600" b="1" strike="noStrike" spc="-1">
-                <a:solidFill>
-                  <a:srgbClr val="000000"/>
-                </a:solidFill>
-                <a:latin typeface="Calibri"/>
-                <a:ea typeface="DejaVu Sans"/>
+              <a:rPr lang="en-AU" sz="4800" b="0" strike="noStrike" spc="-1" dirty="0">
+                <a:latin typeface="Arial"/>
               </a:rPr>
-              <a:t>Project Management</a:t>
+              <a:t>Project Infrastructure</a:t>
             </a:r>
-            <a:endParaRPr lang="en-AU" sz="3600" b="0" strike="noStrike" spc="-1">
-              <a:latin typeface="Arial"/>
-            </a:endParaRPr>
-          </a:p>
-          <a:p>
-            <a:pPr algn="ctr">
-              <a:lnSpc>
-                <a:spcPct val="100000"/>
-              </a:lnSpc>
-            </a:pPr>
-            <a:r>
-              <a:rPr lang="en-AU" sz="2400" b="1" strike="noStrike" spc="-1">
-                <a:solidFill>
-                  <a:srgbClr val="000000"/>
-                </a:solidFill>
-                <a:latin typeface="Calibri"/>
-                <a:ea typeface="DejaVu Sans"/>
-              </a:rPr>
-              <a:t>(old method)</a:t>
-            </a:r>
-            <a:endParaRPr lang="en-AU" sz="2400" b="0" strike="noStrike" spc="-1">
-              <a:latin typeface="Arial"/>
-            </a:endParaRPr>
           </a:p>
         </p:txBody>
       </p:sp>
       <p:pic>
         <p:nvPicPr>
-          <p:cNvPr id="121" name="Picture 4"/>
-          <p:cNvPicPr/>
+          <p:cNvPr id="4" name="Picture 3">
+            <a:extLst>
+              <a:ext uri="{FF2B5EF4-FFF2-40B4-BE49-F238E27FC236}">
+                <a16:creationId xmlns:a16="http://schemas.microsoft.com/office/drawing/2014/main" id="{8BAFE132-EAF8-C04F-9BC8-D2F7CC6409E2}"/>
+              </a:ext>
+            </a:extLst>
+          </p:cNvPr>
+          <p:cNvPicPr>
+            <a:picLocks noChangeAspect="1"/>
+          </p:cNvPicPr>
           <p:nvPr/>
         </p:nvPicPr>
         <p:blipFill>
           <a:blip r:embed="rId3"/>
-          <a:stretch/>
+          <a:stretch>
+            <a:fillRect/>
+          </a:stretch>
         </p:blipFill>
         <p:spPr>
           <a:xfrm>
-            <a:off x="7411224" y="4855581"/>
-            <a:ext cx="1493736" cy="508392"/>
-          </a:xfrm>
-          <a:prstGeom prst="rect">
-            <a:avLst/>
-          </a:prstGeom>
-          <a:ln>
-            <a:noFill/>
-          </a:ln>
+            <a:off x="8665525" y="1390986"/>
+            <a:ext cx="3810000" cy="1485900"/>
+          </a:xfrm>
+          <a:prstGeom prst="rect">
+            <a:avLst/>
+          </a:prstGeom>
         </p:spPr>
       </p:pic>
-      <p:pic>
-        <p:nvPicPr>
-          <p:cNvPr id="122" name="Picture 5"/>
-          <p:cNvPicPr/>
+      <p:sp>
+        <p:nvSpPr>
+          <p:cNvPr id="5" name="TextBox 4">
+            <a:extLst>
+              <a:ext uri="{FF2B5EF4-FFF2-40B4-BE49-F238E27FC236}">
+                <a16:creationId xmlns:a16="http://schemas.microsoft.com/office/drawing/2014/main" id="{3F99D122-6E91-D648-80CE-E6636F2A914D}"/>
+              </a:ext>
+            </a:extLst>
+          </p:cNvPr>
+          <p:cNvSpPr txBox="1"/>
           <p:nvPr/>
-        </p:nvPicPr>
-        <p:blipFill>
-          <a:blip r:embed="rId4"/>
-          <a:stretch/>
-        </p:blipFill>
-        <p:spPr>
-          <a:xfrm>
-            <a:off x="7411224" y="5546346"/>
-            <a:ext cx="1493736" cy="832853"/>
-          </a:xfrm>
-          <a:prstGeom prst="rect">
-            <a:avLst/>
-          </a:prstGeom>
-          <a:ln>
-            <a:noFill/>
-          </a:ln>
-        </p:spPr>
-      </p:pic>
-      <p:sp>
-        <p:nvSpPr>
-          <p:cNvPr id="123" name="CustomShape 2"/>
-          <p:cNvSpPr/>
+        </p:nvSpPr>
+        <p:spPr>
+          <a:xfrm>
+            <a:off x="7075055" y="3481840"/>
+            <a:ext cx="4442691" cy="1569660"/>
+          </a:xfrm>
+          <a:prstGeom prst="rect">
+            <a:avLst/>
+          </a:prstGeom>
+          <a:noFill/>
+        </p:spPr>
+        <p:txBody>
+          <a:bodyPr wrap="square" rtlCol="0">
+            <a:spAutoFit/>
+          </a:bodyPr>
+          <a:lstStyle/>
+          <a:p>
+            <a:r>
+              <a:rPr lang="en-US" sz="2400" dirty="0"/>
+              <a:t>We rented a low spec’d VPS</a:t>
+            </a:r>
+          </a:p>
+          <a:p>
+            <a:endParaRPr lang="en-US" dirty="0"/>
+          </a:p>
+          <a:p>
+            <a:r>
+              <a:rPr lang="en-US" dirty="0"/>
+              <a:t> - Dedicated IP address</a:t>
+            </a:r>
+          </a:p>
+          <a:p>
+            <a:r>
+              <a:rPr lang="en-US" dirty="0"/>
+              <a:t> - Full root access – can run any service required</a:t>
+            </a:r>
+          </a:p>
+        </p:txBody>
+      </p:sp>
+      <p:sp>
+        <p:nvSpPr>
+          <p:cNvPr id="6" name="TextBox 5">
+            <a:extLst>
+              <a:ext uri="{FF2B5EF4-FFF2-40B4-BE49-F238E27FC236}">
+                <a16:creationId xmlns:a16="http://schemas.microsoft.com/office/drawing/2014/main" id="{C3CC43ED-0FB2-FE4E-9A5B-25EA7E1597B3}"/>
+              </a:ext>
+            </a:extLst>
+          </p:cNvPr>
+          <p:cNvSpPr txBox="1"/>
           <p:nvPr/>
         </p:nvSpPr>
         <p:spPr>
           <a:xfrm>
-            <a:off x="6569281" y="4428086"/>
-            <a:ext cx="3177622" cy="2491440"/>
-          </a:xfrm>
-          <a:prstGeom prst="mathMultiply">
-            <a:avLst>
-              <a:gd name="adj1" fmla="val 23520"/>
-            </a:avLst>
-          </a:prstGeom>
-          <a:gradFill rotWithShape="0">
-            <a:gsLst>
-              <a:gs pos="0">
-                <a:srgbClr val="970000"/>
-              </a:gs>
-              <a:gs pos="50000">
-                <a:srgbClr val="D60000"/>
-              </a:gs>
-              <a:gs pos="100000">
-                <a:srgbClr val="FF0000"/>
-              </a:gs>
-            </a:gsLst>
-            <a:lin ang="0"/>
-          </a:gradFill>
-          <a:ln>
-            <a:noFill/>
-          </a:ln>
-        </p:spPr>
-        <p:style>
-          <a:lnRef idx="0">
-            <a:scrgbClr r="0" g="0" b="0"/>
-          </a:lnRef>
-          <a:fillRef idx="0">
-            <a:scrgbClr r="0" g="0" b="0"/>
-          </a:fillRef>
-          <a:effectRef idx="0">
-            <a:scrgbClr r="0" g="0" b="0"/>
-          </a:effectRef>
-          <a:fontRef idx="minor"/>
-        </p:style>
+            <a:off x="1136072" y="3481840"/>
+            <a:ext cx="3408219" cy="1631216"/>
+          </a:xfrm>
+          <a:prstGeom prst="rect">
+            <a:avLst/>
+          </a:prstGeom>
+          <a:noFill/>
+        </p:spPr>
+        <p:txBody>
+          <a:bodyPr wrap="square" rtlCol="0">
+            <a:spAutoFit/>
+          </a:bodyPr>
+          <a:lstStyle/>
+          <a:p>
+            <a:r>
+              <a:rPr lang="en-US" sz="3200" dirty="0" err="1"/>
+              <a:t>NotDotCom.Fun</a:t>
+            </a:r>
+            <a:endParaRPr lang="en-US" sz="3200" dirty="0"/>
+          </a:p>
+          <a:p>
+            <a:r>
+              <a:rPr lang="en-US" sz="3200" dirty="0"/>
+              <a:t> </a:t>
+            </a:r>
+          </a:p>
+          <a:p>
+            <a:r>
+              <a:rPr lang="en-US" dirty="0"/>
+              <a:t>- Inexpensive DNS </a:t>
+            </a:r>
+          </a:p>
+          <a:p>
+            <a:r>
+              <a:rPr lang="en-US" dirty="0"/>
+              <a:t>- Easy to Remember</a:t>
+            </a:r>
+          </a:p>
+        </p:txBody>
+      </p:sp>
+      <p:sp>
+        <p:nvSpPr>
+          <p:cNvPr id="8" name="TextBox 7">
+            <a:extLst>
+              <a:ext uri="{FF2B5EF4-FFF2-40B4-BE49-F238E27FC236}">
+                <a16:creationId xmlns:a16="http://schemas.microsoft.com/office/drawing/2014/main" id="{11FD5BAA-30E6-0340-B951-A1238C90A784}"/>
+              </a:ext>
+            </a:extLst>
+          </p:cNvPr>
+          <p:cNvSpPr txBox="1"/>
+          <p:nvPr/>
+        </p:nvSpPr>
+        <p:spPr>
+          <a:xfrm>
+            <a:off x="822036" y="2045889"/>
+            <a:ext cx="4544291" cy="830997"/>
+          </a:xfrm>
+          <a:prstGeom prst="rect">
+            <a:avLst/>
+          </a:prstGeom>
+          <a:noFill/>
+        </p:spPr>
+        <p:txBody>
+          <a:bodyPr wrap="square" rtlCol="0">
+            <a:spAutoFit/>
+          </a:bodyPr>
+          <a:lstStyle/>
+          <a:p>
+            <a:r>
+              <a:rPr lang="en-US" sz="4800" dirty="0"/>
+              <a:t>137.262.34.109</a:t>
+            </a:r>
+          </a:p>
+        </p:txBody>
       </p:sp>
     </p:spTree>
+    <p:extLst>
+      <p:ext uri="{BB962C8B-B14F-4D97-AF65-F5344CB8AC3E}">
+        <p14:creationId xmlns:p14="http://schemas.microsoft.com/office/powerpoint/2010/main" val="2636681706"/>
+      </p:ext>
+    </p:extLst>
   </p:cSld>
   <p:clrMapOvr>
     <a:masterClrMapping/>
   </p:clrMapOvr>
-  <p:timing>
-    <p:tnLst>
-      <p:par>
-        <p:cTn id="1" dur="indefinite" restart="never" nodeType="tmRoot">
-          <p:childTnLst>
-            <p:seq>
-              <p:cTn id="2" dur="indefinite" nodeType="mainSeq">
-                <p:childTnLst>
-                  <p:par>
-                    <p:cTn id="3" fill="hold">
-                      <p:stCondLst>
-                        <p:cond delay="indefinite"/>
-                      </p:stCondLst>
-                      <p:childTnLst>
-                        <p:par>
-                          <p:cTn id="4" fill="hold">
-                            <p:stCondLst>
-                              <p:cond delay="0"/>
-                            </p:stCondLst>
-                            <p:childTnLst>
-                              <p:par>
-                                <p:cTn id="5" presetID="1" presetClass="entr" fill="hold" nodeType="clickEffect">
-                                  <p:stCondLst>
-                                    <p:cond delay="0"/>
-                                  </p:stCondLst>
-                                  <p:childTnLst>
-                                    <p:set>
-                                      <p:cBhvr>
-                                        <p:cTn id="6" dur="1" fill="hold">
-                                          <p:stCondLst>
-                                            <p:cond delay="0"/>
-                                          </p:stCondLst>
-                                        </p:cTn>
-                                        <p:tgtEl>
-                                          <p:spTgt spid="123"/>
-                                        </p:tgtEl>
-                                        <p:attrNameLst>
-                                          <p:attrName>style.visibility</p:attrName>
-                                        </p:attrNameLst>
-                                      </p:cBhvr>
-                                      <p:to>
-                                        <p:strVal val="visible"/>
-                                      </p:to>
-                                    </p:set>
-                                  </p:childTnLst>
-                                </p:cTn>
-                              </p:par>
-                            </p:childTnLst>
-                          </p:cTn>
-                        </p:par>
-                      </p:childTnLst>
-                    </p:cTn>
-                  </p:par>
-                </p:childTnLst>
-              </p:cTn>
-              <p:prevCondLst>
-                <p:cond evt="onPrev" delay="0">
-                  <p:tgtEl>
-                    <p:sldTgt/>
-                  </p:tgtEl>
-                </p:cond>
-              </p:prevCondLst>
-              <p:nextCondLst>
-                <p:cond evt="onNext" delay="0">
-                  <p:tgtEl>
-                    <p:sldTgt/>
-                  </p:tgtEl>
-                </p:cond>
-              </p:nextCondLst>
-            </p:seq>
-          </p:childTnLst>
-        </p:cTn>
-      </p:par>
-    </p:tnLst>
-  </p:timing>
 </p:sld>
 </file>
 
@@ -10114,92 +10113,183 @@
       </p:grpSpPr>
       <p:sp>
         <p:nvSpPr>
-          <p:cNvPr id="178" name="CustomShape 1"/>
-          <p:cNvSpPr/>
+          <p:cNvPr id="2" name="Title 1">
+            <a:extLst>
+              <a:ext uri="{FF2B5EF4-FFF2-40B4-BE49-F238E27FC236}">
+                <a16:creationId xmlns:a16="http://schemas.microsoft.com/office/drawing/2014/main" id="{A1848501-653D-F04E-98D5-FD020EBA8C3F}"/>
+              </a:ext>
+            </a:extLst>
+          </p:cNvPr>
+          <p:cNvSpPr>
+            <a:spLocks noGrp="1"/>
+          </p:cNvSpPr>
+          <p:nvPr>
+            <p:ph type="title"/>
+          </p:nvPr>
+        </p:nvSpPr>
+        <p:spPr/>
+        <p:txBody>
+          <a:bodyPr/>
+          <a:lstStyle/>
+          <a:p>
+            <a:pPr algn="ctr"/>
+            <a:r>
+              <a:rPr lang="en-US" dirty="0"/>
+              <a:t>Known Security Issues</a:t>
+            </a:r>
+          </a:p>
+        </p:txBody>
+      </p:sp>
+      <p:sp>
+        <p:nvSpPr>
+          <p:cNvPr id="3" name="Subtitle 2">
+            <a:extLst>
+              <a:ext uri="{FF2B5EF4-FFF2-40B4-BE49-F238E27FC236}">
+                <a16:creationId xmlns:a16="http://schemas.microsoft.com/office/drawing/2014/main" id="{AD3474A6-F3EA-CC4C-9A2C-9CEE03A13913}"/>
+              </a:ext>
+            </a:extLst>
+          </p:cNvPr>
+          <p:cNvSpPr>
+            <a:spLocks noGrp="1"/>
+          </p:cNvSpPr>
+          <p:nvPr>
+            <p:ph type="subTitle"/>
+          </p:nvPr>
+        </p:nvSpPr>
+        <p:spPr/>
+        <p:txBody>
+          <a:bodyPr/>
+          <a:lstStyle/>
+          <a:p>
+            <a:endParaRPr lang="en-US" sz="2400" dirty="0"/>
+          </a:p>
+          <a:p>
+            <a:endParaRPr lang="en-US" sz="2400" dirty="0"/>
+          </a:p>
+          <a:p>
+            <a:endParaRPr lang="en-US" sz="2400" dirty="0"/>
+          </a:p>
+          <a:p>
+            <a:endParaRPr lang="en-US" sz="2400" dirty="0"/>
+          </a:p>
+          <a:p>
+            <a:endParaRPr lang="en-US" sz="2400" dirty="0"/>
+          </a:p>
+          <a:p>
+            <a:endParaRPr lang="en-US" sz="2400" dirty="0"/>
+          </a:p>
+        </p:txBody>
+      </p:sp>
+      <p:sp>
+        <p:nvSpPr>
+          <p:cNvPr id="4" name="TextBox 3">
+            <a:extLst>
+              <a:ext uri="{FF2B5EF4-FFF2-40B4-BE49-F238E27FC236}">
+                <a16:creationId xmlns:a16="http://schemas.microsoft.com/office/drawing/2014/main" id="{2B297888-EE8D-0045-A532-ACD694ABF7B6}"/>
+              </a:ext>
+            </a:extLst>
+          </p:cNvPr>
+          <p:cNvSpPr txBox="1"/>
           <p:nvPr/>
         </p:nvSpPr>
         <p:spPr>
           <a:xfrm>
-            <a:off x="0" y="169920"/>
-            <a:ext cx="12191040" cy="638280"/>
+            <a:off x="867266" y="1630837"/>
+            <a:ext cx="10893763" cy="5078313"/>
           </a:xfrm>
           <a:prstGeom prst="rect">
             <a:avLst/>
           </a:prstGeom>
           <a:noFill/>
-          <a:ln>
-            <a:noFill/>
-          </a:ln>
-        </p:spPr>
-        <p:style>
-          <a:lnRef idx="0">
-            <a:scrgbClr r="0" g="0" b="0"/>
-          </a:lnRef>
-          <a:fillRef idx="0">
-            <a:scrgbClr r="0" g="0" b="0"/>
-          </a:fillRef>
-          <a:effectRef idx="0">
-            <a:scrgbClr r="0" g="0" b="0"/>
-          </a:effectRef>
-          <a:fontRef idx="minor"/>
-        </p:style>
-        <p:txBody>
-          <a:bodyPr lIns="90000" tIns="45000" rIns="90000" bIns="45000"/>
-          <a:lstStyle/>
-          <a:p>
-            <a:pPr algn="ctr">
-              <a:lnSpc>
-                <a:spcPct val="100000"/>
-              </a:lnSpc>
+        </p:spPr>
+        <p:txBody>
+          <a:bodyPr wrap="square" rtlCol="0">
+            <a:spAutoFit/>
+          </a:bodyPr>
+          <a:lstStyle/>
+          <a:p>
+            <a:pPr marL="285750" indent="-285750">
+              <a:buFont typeface="Arial" panose="020B0604020202020204" pitchFamily="34" charset="0"/>
+              <a:buChar char="•"/>
             </a:pPr>
             <a:r>
-              <a:rPr lang="en-AU" sz="3600" b="1" strike="noStrike" spc="-1">
-                <a:solidFill>
-                  <a:srgbClr val="000000"/>
-                </a:solidFill>
-                <a:latin typeface="Calibri"/>
-                <a:ea typeface="DejaVu Sans"/>
-              </a:rPr>
-              <a:t>Security</a:t>
+              <a:rPr lang="en-US" sz="3600" dirty="0"/>
+              <a:t>Initial security intentionally lax to ease collaboration</a:t>
             </a:r>
-            <a:endParaRPr lang="en-AU" sz="3600" b="0" strike="noStrike" spc="-1">
-              <a:latin typeface="Arial"/>
-            </a:endParaRPr>
+          </a:p>
+          <a:p>
+            <a:pPr marL="285750" indent="-285750">
+              <a:buFont typeface="Arial" panose="020B0604020202020204" pitchFamily="34" charset="0"/>
+              <a:buChar char="•"/>
+            </a:pPr>
+            <a:r>
+              <a:rPr lang="en-US" sz="3600" dirty="0"/>
+              <a:t>Common database user across all copies of database</a:t>
+            </a:r>
+          </a:p>
+          <a:p>
+            <a:pPr marL="285750" indent="-285750">
+              <a:buFont typeface="Arial" panose="020B0604020202020204" pitchFamily="34" charset="0"/>
+              <a:buChar char="•"/>
+            </a:pPr>
+            <a:r>
+              <a:rPr lang="en-US" sz="3600" dirty="0"/>
+              <a:t>Passwords stored in files in repository (</a:t>
+            </a:r>
+            <a:r>
+              <a:rPr lang="en-US" sz="3600" dirty="0" err="1"/>
+              <a:t>wp-config.php</a:t>
+            </a:r>
+            <a:r>
+              <a:rPr lang="en-US" sz="3600" dirty="0"/>
+              <a:t> &amp; </a:t>
+            </a:r>
+            <a:r>
+              <a:rPr lang="en-US" sz="3600" dirty="0" err="1"/>
+              <a:t>configs.ini</a:t>
+            </a:r>
+            <a:r>
+              <a:rPr lang="en-US" sz="3600" dirty="0"/>
+              <a:t>)</a:t>
+            </a:r>
+          </a:p>
+          <a:p>
+            <a:pPr marL="285750" indent="-285750">
+              <a:buFont typeface="Arial" panose="020B0604020202020204" pitchFamily="34" charset="0"/>
+              <a:buChar char="•"/>
+            </a:pPr>
+            <a:r>
+              <a:rPr lang="en-US" sz="3600" dirty="0"/>
+              <a:t>Use git filter-branch to expunge all password-containing files</a:t>
+            </a:r>
+          </a:p>
+          <a:p>
+            <a:pPr marL="285750" indent="-285750">
+              <a:buFont typeface="Arial" panose="020B0604020202020204" pitchFamily="34" charset="0"/>
+              <a:buChar char="•"/>
+            </a:pPr>
+            <a:r>
+              <a:rPr lang="en-US" sz="3600" dirty="0"/>
+              <a:t>Shell commands to clean up file ownership/</a:t>
+            </a:r>
+            <a:r>
+              <a:rPr lang="en-US" sz="3600"/>
+              <a:t>permissions prior to delivery</a:t>
+            </a:r>
+            <a:endParaRPr lang="en-US" sz="3600" dirty="0"/>
           </a:p>
         </p:txBody>
       </p:sp>
     </p:spTree>
+    <p:extLst>
+      <p:ext uri="{BB962C8B-B14F-4D97-AF65-F5344CB8AC3E}">
+        <p14:creationId xmlns:p14="http://schemas.microsoft.com/office/powerpoint/2010/main" val="3985461418"/>
+      </p:ext>
+    </p:extLst>
   </p:cSld>
   <p:clrMapOvr>
     <a:masterClrMapping/>
   </p:clrMapOvr>
-  <p:timing>
-    <p:tnLst>
-      <p:par>
-        <p:cTn id="1" dur="indefinite" restart="never" nodeType="tmRoot">
-          <p:childTnLst>
-            <p:seq>
-              <p:cTn id="2" dur="indefinite" nodeType="mainSeq"/>
-              <p:prevCondLst>
-                <p:cond evt="onPrev" delay="0">
-                  <p:tgtEl>
-                    <p:sldTgt/>
-                  </p:tgtEl>
-                </p:cond>
-              </p:prevCondLst>
-              <p:nextCondLst>
-                <p:cond evt="onNext" delay="0">
-                  <p:tgtEl>
-                    <p:sldTgt/>
-                  </p:tgtEl>
-                </p:cond>
-              </p:nextCondLst>
-            </p:seq>
-          </p:childTnLst>
-        </p:cTn>
-      </p:par>
-    </p:tnLst>
-  </p:timing>
 </p:sld>
 </file>
 

</xml_diff>